<commit_message>
Added Command Line Tools ppt
</commit_message>
<xml_diff>
--- a/commandlinetools/ppt/Command Line Tools.pptx
+++ b/commandlinetools/ppt/Command Line Tools.pptx
@@ -5657,10 +5657,10 @@
                   <a:srgbClr val="92D050"/>
                 </a:solidFill>
               </a:rPr>
-              <a:t>marishabarton</a:t>
-            </a:r>
-            <a:r>
-              <a:rPr lang="en-US" sz="2000" dirty="0">
+              <a:t>darthvader</a:t>
+            </a:r>
+            <a:r>
+              <a:rPr lang="en-US" sz="2000" dirty="0" smtClean="0">
                 <a:solidFill>
                   <a:srgbClr val="92D050"/>
                 </a:solidFill>
@@ -5668,12 +5668,8 @@
               <a:t>,</a:t>
             </a:r>
             <a:r>
-              <a:rPr lang="en-US" sz="2000" dirty="0"/>
-              <a:t> </a:t>
-            </a:r>
-            <a:r>
               <a:rPr lang="en-US" sz="2000" dirty="0" smtClean="0"/>
-              <a:t>          </a:t>
+              <a:t>           </a:t>
             </a:r>
             <a:r>
               <a:rPr lang="en-US" sz="2000" dirty="0" smtClean="0">
@@ -5726,7 +5722,7 @@
               <a:t>mail</a:t>
             </a:r>
             <a:r>
-              <a:rPr lang="en-US" sz="2000" dirty="0">
+              <a:rPr lang="en-US" sz="2000">
                 <a:solidFill>
                   <a:srgbClr val="FF0000"/>
                 </a:solidFill>
@@ -5734,17 +5730,30 @@
               <a:t>:</a:t>
             </a:r>
             <a:r>
-              <a:rPr lang="en-US" sz="2000" dirty="0"/>
+              <a:rPr lang="en-US" sz="2000"/>
               <a:t> </a:t>
             </a:r>
             <a:r>
-              <a:rPr lang="en-US" sz="2000" dirty="0" smtClean="0">
+              <a:rPr lang="en-US" sz="2000" smtClean="0">
                 <a:solidFill>
                   <a:srgbClr val="92D050"/>
                 </a:solidFill>
               </a:rPr>
-              <a:t>pcmbart1@ihc.com</a:t>
-            </a:r>
+              <a:t>sithlord</a:t>
+            </a:r>
+            <a:r>
+              <a:rPr lang="en-US" sz="2000" smtClean="0">
+                <a:solidFill>
+                  <a:srgbClr val="92D050"/>
+                </a:solidFill>
+              </a:rPr>
+              <a:t>@ihc.com</a:t>
+            </a:r>
+            <a:endParaRPr lang="en-US" sz="2000" dirty="0" smtClean="0">
+              <a:solidFill>
+                <a:srgbClr val="92D050"/>
+              </a:solidFill>
+            </a:endParaRPr>
           </a:p>
           <a:p>
             <a:pPr marL="0" indent="0">
@@ -6709,6 +6718,20 @@
 </file>
 
 <file path=customXml/item1.xml><?xml version="1.0" encoding="utf-8"?>
+<?mso-contentType ?>
+<FormTemplates xmlns="http://schemas.microsoft.com/sharepoint/v3/contenttype/forms">
+  <Display>DocumentLibraryForm</Display>
+  <Edit>DocumentLibraryForm</Edit>
+  <New>DocumentLibraryForm</New>
+</FormTemplates>
+</file>
+
+<file path=customXml/item2.xml><?xml version="1.0" encoding="utf-8"?>
+<?mso-contentType ?>
+<SharedContentType xmlns="Microsoft.SharePoint.Taxonomy.ContentTypeSync" SourceId="93bcccac-9386-4e9c-8156-47996da43f53" ContentTypeId="0x0101" PreviousValue="false"/>
+</file>
+
+<file path=customXml/item3.xml><?xml version="1.0" encoding="utf-8"?>
 <ct:contentTypeSchema xmlns:ct="http://schemas.microsoft.com/office/2006/metadata/contentType" xmlns:ma="http://schemas.microsoft.com/office/2006/metadata/properties/metaAttributes" ct:_="" ma:_="" ma:contentTypeName="IH Document" ma:contentTypeID="0x0101002AD1DD88DE798E40AFADFC5F01FFECA800DCBF066A63932D4B9C0598AE555FB4E4" ma:contentTypeVersion="16" ma:contentTypeDescription="" ma:contentTypeScope="" ma:versionID="ea999e61bed5fbf569dc4cbb34337cfb">
   <xsd:schema xmlns:xsd="http://www.w3.org/2001/XMLSchema" xmlns:xs="http://www.w3.org/2001/XMLSchema" xmlns:p="http://schemas.microsoft.com/office/2006/metadata/properties" xmlns:ns3="22be0be7-9e35-4b01-967c-b1a6133b0a57" xmlns:ns4="281728da-8900-40e4-867f-14504f602392" targetNamespace="http://schemas.microsoft.com/office/2006/metadata/properties" ma:root="true" ma:fieldsID="4b3d96283ea4dccf45de5a30481634ec" ns3:_="" ns4:_="">
     <xsd:import namespace="22be0be7-9e35-4b01-967c-b1a6133b0a57"/>
@@ -6892,20 +6915,6 @@
 </ct:contentTypeSchema>
 </file>
 
-<file path=customXml/item2.xml><?xml version="1.0" encoding="utf-8"?>
-<?mso-contentType ?>
-<SharedContentType xmlns="Microsoft.SharePoint.Taxonomy.ContentTypeSync" SourceId="93bcccac-9386-4e9c-8156-47996da43f53" ContentTypeId="0x0101" PreviousValue="false"/>
-</file>
-
-<file path=customXml/item3.xml><?xml version="1.0" encoding="utf-8"?>
-<?mso-contentType ?>
-<FormTemplates xmlns="http://schemas.microsoft.com/sharepoint/v3/contenttype/forms">
-  <Display>DocumentLibraryForm</Display>
-  <Edit>DocumentLibraryForm</Edit>
-  <New>DocumentLibraryForm</New>
-</FormTemplates>
-</file>
-
 <file path=customXml/item4.xml><?xml version="1.0" encoding="utf-8"?>
 <p:properties xmlns:p="http://schemas.microsoft.com/office/2006/metadata/properties" xmlns:xsi="http://www.w3.org/2001/XMLSchema-instance" xmlns:pc="http://schemas.microsoft.com/office/infopath/2007/PartnerControls">
   <documentManagement>
@@ -6922,6 +6931,22 @@
 </file>
 
 <file path=customXml/itemProps1.xml><?xml version="1.0" encoding="utf-8"?>
+<ds:datastoreItem xmlns:ds="http://schemas.openxmlformats.org/officeDocument/2006/customXml" ds:itemID="{A16E1082-18EF-4A99-B6C8-2DE155B8F6EA}">
+  <ds:schemaRefs>
+    <ds:schemaRef ds:uri="http://schemas.microsoft.com/sharepoint/v3/contenttype/forms"/>
+  </ds:schemaRefs>
+</ds:datastoreItem>
+</file>
+
+<file path=customXml/itemProps2.xml><?xml version="1.0" encoding="utf-8"?>
+<ds:datastoreItem xmlns:ds="http://schemas.openxmlformats.org/officeDocument/2006/customXml" ds:itemID="{8EDAE699-BC1D-48EA-B821-7D8A0556B743}">
+  <ds:schemaRefs>
+    <ds:schemaRef ds:uri="Microsoft.SharePoint.Taxonomy.ContentTypeSync"/>
+  </ds:schemaRefs>
+</ds:datastoreItem>
+</file>
+
+<file path=customXml/itemProps3.xml><?xml version="1.0" encoding="utf-8"?>
 <ds:datastoreItem xmlns:ds="http://schemas.openxmlformats.org/officeDocument/2006/customXml" ds:itemID="{5A1CA35A-0E09-4F42-894C-A20A3EA54838}">
   <ds:schemaRefs>
     <ds:schemaRef ds:uri="http://schemas.microsoft.com/office/2006/metadata/contentType"/>
@@ -6936,22 +6961,6 @@
     <ds:schemaRef ds:uri="http://purl.org/dc/elements/1.1/"/>
     <ds:schemaRef ds:uri="http://purl.org/dc/terms/"/>
     <ds:schemaRef ds:uri="http://schemas.microsoft.com/internal/obd"/>
-  </ds:schemaRefs>
-</ds:datastoreItem>
-</file>
-
-<file path=customXml/itemProps2.xml><?xml version="1.0" encoding="utf-8"?>
-<ds:datastoreItem xmlns:ds="http://schemas.openxmlformats.org/officeDocument/2006/customXml" ds:itemID="{8EDAE699-BC1D-48EA-B821-7D8A0556B743}">
-  <ds:schemaRefs>
-    <ds:schemaRef ds:uri="Microsoft.SharePoint.Taxonomy.ContentTypeSync"/>
-  </ds:schemaRefs>
-</ds:datastoreItem>
-</file>
-
-<file path=customXml/itemProps3.xml><?xml version="1.0" encoding="utf-8"?>
-<ds:datastoreItem xmlns:ds="http://schemas.openxmlformats.org/officeDocument/2006/customXml" ds:itemID="{A16E1082-18EF-4A99-B6C8-2DE155B8F6EA}">
-  <ds:schemaRefs>
-    <ds:schemaRef ds:uri="http://schemas.microsoft.com/sharepoint/v3/contenttype/forms"/>
   </ds:schemaRefs>
 </ds:datastoreItem>
 </file>

</xml_diff>